<commit_message>
reviewed first two chapters
</commit_message>
<xml_diff>
--- a/Reports/UML/diagram.pptx
+++ b/Reports/UML/diagram.pptx
@@ -10,6 +10,7 @@
     <p:sldId id="259" r:id="rId4"/>
     <p:sldId id="258" r:id="rId5"/>
     <p:sldId id="260" r:id="rId6"/>
+    <p:sldId id="261" r:id="rId7"/>
   </p:sldIdLst>
   <p:sldSz cx="12192000" cy="6858000"/>
   <p:notesSz cx="6858000" cy="9144000"/>
@@ -259,7 +260,7 @@
           <a:p>
             <a:fld id="{37D254DE-7F3D-4BFF-BC2F-8BA99F5ABEC1}" type="datetimeFigureOut">
               <a:rPr lang="en-GB" smtClean="0"/>
-              <a:t>04/05/2016</a:t>
+              <a:t>07/05/2016</a:t>
             </a:fld>
             <a:endParaRPr lang="en-GB"/>
           </a:p>
@@ -429,7 +430,7 @@
           <a:p>
             <a:fld id="{37D254DE-7F3D-4BFF-BC2F-8BA99F5ABEC1}" type="datetimeFigureOut">
               <a:rPr lang="en-GB" smtClean="0"/>
-              <a:t>04/05/2016</a:t>
+              <a:t>07/05/2016</a:t>
             </a:fld>
             <a:endParaRPr lang="en-GB"/>
           </a:p>
@@ -609,7 +610,7 @@
           <a:p>
             <a:fld id="{37D254DE-7F3D-4BFF-BC2F-8BA99F5ABEC1}" type="datetimeFigureOut">
               <a:rPr lang="en-GB" smtClean="0"/>
-              <a:t>04/05/2016</a:t>
+              <a:t>07/05/2016</a:t>
             </a:fld>
             <a:endParaRPr lang="en-GB"/>
           </a:p>
@@ -779,7 +780,7 @@
           <a:p>
             <a:fld id="{37D254DE-7F3D-4BFF-BC2F-8BA99F5ABEC1}" type="datetimeFigureOut">
               <a:rPr lang="en-GB" smtClean="0"/>
-              <a:t>04/05/2016</a:t>
+              <a:t>07/05/2016</a:t>
             </a:fld>
             <a:endParaRPr lang="en-GB"/>
           </a:p>
@@ -1025,7 +1026,7 @@
           <a:p>
             <a:fld id="{37D254DE-7F3D-4BFF-BC2F-8BA99F5ABEC1}" type="datetimeFigureOut">
               <a:rPr lang="en-GB" smtClean="0"/>
-              <a:t>04/05/2016</a:t>
+              <a:t>07/05/2016</a:t>
             </a:fld>
             <a:endParaRPr lang="en-GB"/>
           </a:p>
@@ -1257,7 +1258,7 @@
           <a:p>
             <a:fld id="{37D254DE-7F3D-4BFF-BC2F-8BA99F5ABEC1}" type="datetimeFigureOut">
               <a:rPr lang="en-GB" smtClean="0"/>
-              <a:t>04/05/2016</a:t>
+              <a:t>07/05/2016</a:t>
             </a:fld>
             <a:endParaRPr lang="en-GB"/>
           </a:p>
@@ -1624,7 +1625,7 @@
           <a:p>
             <a:fld id="{37D254DE-7F3D-4BFF-BC2F-8BA99F5ABEC1}" type="datetimeFigureOut">
               <a:rPr lang="en-GB" smtClean="0"/>
-              <a:t>04/05/2016</a:t>
+              <a:t>07/05/2016</a:t>
             </a:fld>
             <a:endParaRPr lang="en-GB"/>
           </a:p>
@@ -1742,7 +1743,7 @@
           <a:p>
             <a:fld id="{37D254DE-7F3D-4BFF-BC2F-8BA99F5ABEC1}" type="datetimeFigureOut">
               <a:rPr lang="en-GB" smtClean="0"/>
-              <a:t>04/05/2016</a:t>
+              <a:t>07/05/2016</a:t>
             </a:fld>
             <a:endParaRPr lang="en-GB"/>
           </a:p>
@@ -1837,7 +1838,7 @@
           <a:p>
             <a:fld id="{37D254DE-7F3D-4BFF-BC2F-8BA99F5ABEC1}" type="datetimeFigureOut">
               <a:rPr lang="en-GB" smtClean="0"/>
-              <a:t>04/05/2016</a:t>
+              <a:t>07/05/2016</a:t>
             </a:fld>
             <a:endParaRPr lang="en-GB"/>
           </a:p>
@@ -2114,7 +2115,7 @@
           <a:p>
             <a:fld id="{37D254DE-7F3D-4BFF-BC2F-8BA99F5ABEC1}" type="datetimeFigureOut">
               <a:rPr lang="en-GB" smtClean="0"/>
-              <a:t>04/05/2016</a:t>
+              <a:t>07/05/2016</a:t>
             </a:fld>
             <a:endParaRPr lang="en-GB"/>
           </a:p>
@@ -2367,7 +2368,7 @@
           <a:p>
             <a:fld id="{37D254DE-7F3D-4BFF-BC2F-8BA99F5ABEC1}" type="datetimeFigureOut">
               <a:rPr lang="en-GB" smtClean="0"/>
-              <a:t>04/05/2016</a:t>
+              <a:t>07/05/2016</a:t>
             </a:fld>
             <a:endParaRPr lang="en-GB"/>
           </a:p>
@@ -2580,7 +2581,7 @@
           <a:p>
             <a:fld id="{37D254DE-7F3D-4BFF-BC2F-8BA99F5ABEC1}" type="datetimeFigureOut">
               <a:rPr lang="en-GB" smtClean="0"/>
-              <a:t>04/05/2016</a:t>
+              <a:t>07/05/2016</a:t>
             </a:fld>
             <a:endParaRPr lang="en-GB"/>
           </a:p>
@@ -7433,6 +7434,13 @@
               <a:t>Uniform Resource Name</a:t>
             </a:r>
           </a:p>
+          <a:p>
+            <a:pPr algn="ctr"/>
+            <a:r>
+              <a:rPr lang="en-GB" dirty="0"/>
+              <a:t>(URN)</a:t>
+            </a:r>
+          </a:p>
         </p:txBody>
       </p:sp>
       <p:sp>
@@ -7476,6 +7484,13 @@
               <a:t>Uniform Resource Locator</a:t>
             </a:r>
           </a:p>
+          <a:p>
+            <a:pPr algn="ctr"/>
+            <a:r>
+              <a:rPr lang="en-GB" dirty="0"/>
+              <a:t>(URL)</a:t>
+            </a:r>
+          </a:p>
         </p:txBody>
       </p:sp>
       <p:sp>
@@ -7517,6 +7532,13 @@
             <a:r>
               <a:rPr lang="en-GB" dirty="0"/>
               <a:t>Uniform Resource Identifier</a:t>
+            </a:r>
+          </a:p>
+          <a:p>
+            <a:pPr algn="ctr"/>
+            <a:r>
+              <a:rPr lang="en-GB" dirty="0"/>
+              <a:t>(URI)</a:t>
             </a:r>
           </a:p>
         </p:txBody>
@@ -7593,6 +7615,363 @@
     <p:extLst>
       <p:ext uri="{BB962C8B-B14F-4D97-AF65-F5344CB8AC3E}">
         <p14:creationId xmlns:p14="http://schemas.microsoft.com/office/powerpoint/2010/main" val="1847985915"/>
+      </p:ext>
+    </p:extLst>
+  </p:cSld>
+  <p:clrMapOvr>
+    <a:masterClrMapping/>
+  </p:clrMapOvr>
+</p:sld>
+</file>
+
+<file path=ppt/slides/slide6.xml><?xml version="1.0" encoding="utf-8"?>
+<p:sld xmlns:a="http://schemas.openxmlformats.org/drawingml/2006/main" xmlns:r="http://schemas.openxmlformats.org/officeDocument/2006/relationships" xmlns:p="http://schemas.openxmlformats.org/presentationml/2006/main">
+  <p:cSld>
+    <p:spTree>
+      <p:nvGrpSpPr>
+        <p:cNvPr id="1" name=""/>
+        <p:cNvGrpSpPr/>
+        <p:nvPr/>
+      </p:nvGrpSpPr>
+      <p:grpSpPr>
+        <a:xfrm>
+          <a:off x="0" y="0"/>
+          <a:ext cx="0" cy="0"/>
+          <a:chOff x="0" y="0"/>
+          <a:chExt cx="0" cy="0"/>
+        </a:xfrm>
+      </p:grpSpPr>
+      <p:graphicFrame>
+        <p:nvGraphicFramePr>
+          <p:cNvPr id="2" name="Table 1"/>
+          <p:cNvGraphicFramePr>
+            <a:graphicFrameLocks noGrp="1"/>
+          </p:cNvGraphicFramePr>
+          <p:nvPr>
+            <p:extLst>
+              <p:ext uri="{D42A27DB-BD31-4B8C-83A1-F6EECF244321}">
+                <p14:modId xmlns:p14="http://schemas.microsoft.com/office/powerpoint/2010/main" val="3093999542"/>
+              </p:ext>
+            </p:extLst>
+          </p:nvPr>
+        </p:nvGraphicFramePr>
+        <p:xfrm>
+          <a:off x="2032000" y="719666"/>
+          <a:ext cx="6180822" cy="1112520"/>
+        </p:xfrm>
+        <a:graphic>
+          <a:graphicData uri="http://schemas.openxmlformats.org/drawingml/2006/table">
+            <a:tbl>
+              <a:tblPr firstRow="1" bandRow="1">
+                <a:tableStyleId>{F2DE63D5-997A-4646-A377-4702673A728D}</a:tableStyleId>
+              </a:tblPr>
+              <a:tblGrid>
+                <a:gridCol w="937703">
+                  <a:extLst>
+                    <a:ext uri="{9D8B030D-6E8A-4147-A177-3AD203B41FA5}">
+                      <a16:colId xmlns:a16="http://schemas.microsoft.com/office/drawing/2014/main" val="2153935519"/>
+                    </a:ext>
+                  </a:extLst>
+                </a:gridCol>
+                <a:gridCol w="1560352">
+                  <a:extLst>
+                    <a:ext uri="{9D8B030D-6E8A-4147-A177-3AD203B41FA5}">
+                      <a16:colId xmlns:a16="http://schemas.microsoft.com/office/drawing/2014/main" val="2657089711"/>
+                    </a:ext>
+                  </a:extLst>
+                </a:gridCol>
+                <a:gridCol w="3682767">
+                  <a:extLst>
+                    <a:ext uri="{9D8B030D-6E8A-4147-A177-3AD203B41FA5}">
+                      <a16:colId xmlns:a16="http://schemas.microsoft.com/office/drawing/2014/main" val="1957334710"/>
+                    </a:ext>
+                  </a:extLst>
+                </a:gridCol>
+              </a:tblGrid>
+              <a:tr h="370840">
+                <a:tc>
+                  <a:txBody>
+                    <a:bodyPr/>
+                    <a:lstStyle/>
+                    <a:p>
+                      <a:r>
+                        <a:rPr lang="en-GB" dirty="0">
+                          <a:latin typeface="+mj-lt"/>
+                        </a:rPr>
+                        <a:t>Subject</a:t>
+                      </a:r>
+                    </a:p>
+                  </a:txBody>
+                  <a:tcPr/>
+                </a:tc>
+                <a:tc>
+                  <a:txBody>
+                    <a:bodyPr/>
+                    <a:lstStyle/>
+                    <a:p>
+                      <a:r>
+                        <a:rPr lang="en-GB" dirty="0">
+                          <a:latin typeface="+mj-lt"/>
+                        </a:rPr>
+                        <a:t>Predicate</a:t>
+                      </a:r>
+                    </a:p>
+                  </a:txBody>
+                  <a:tcPr/>
+                </a:tc>
+                <a:tc>
+                  <a:txBody>
+                    <a:bodyPr/>
+                    <a:lstStyle/>
+                    <a:p>
+                      <a:r>
+                        <a:rPr lang="en-GB" dirty="0">
+                          <a:latin typeface="+mj-lt"/>
+                        </a:rPr>
+                        <a:t>Object</a:t>
+                      </a:r>
+                    </a:p>
+                  </a:txBody>
+                  <a:tcPr/>
+                </a:tc>
+                <a:extLst>
+                  <a:ext uri="{0D108BD9-81ED-4DB2-BD59-A6C34878D82A}">
+                    <a16:rowId xmlns:a16="http://schemas.microsoft.com/office/drawing/2014/main" val="2353136710"/>
+                  </a:ext>
+                </a:extLst>
+              </a:tr>
+              <a:tr h="370840">
+                <a:tc>
+                  <a:txBody>
+                    <a:bodyPr/>
+                    <a:lstStyle/>
+                    <a:p>
+                      <a:r>
+                        <a:rPr lang="en-GB" dirty="0">
+                          <a:latin typeface="+mj-lt"/>
+                        </a:rPr>
+                        <a:t>Delft</a:t>
+                      </a:r>
+                    </a:p>
+                  </a:txBody>
+                  <a:tcPr/>
+                </a:tc>
+                <a:tc>
+                  <a:txBody>
+                    <a:bodyPr/>
+                    <a:lstStyle/>
+                    <a:p>
+                      <a:r>
+                        <a:rPr lang="en-GB" dirty="0">
+                          <a:latin typeface="+mj-lt"/>
+                        </a:rPr>
+                        <a:t>Is a </a:t>
+                      </a:r>
+                    </a:p>
+                  </a:txBody>
+                  <a:tcPr/>
+                </a:tc>
+                <a:tc>
+                  <a:txBody>
+                    <a:bodyPr/>
+                    <a:lstStyle/>
+                    <a:p>
+                      <a:r>
+                        <a:rPr lang="en-GB" dirty="0">
+                          <a:latin typeface="+mj-lt"/>
+                        </a:rPr>
+                        <a:t>Municipality</a:t>
+                      </a:r>
+                    </a:p>
+                  </a:txBody>
+                  <a:tcPr/>
+                </a:tc>
+                <a:extLst>
+                  <a:ext uri="{0D108BD9-81ED-4DB2-BD59-A6C34878D82A}">
+                    <a16:rowId xmlns:a16="http://schemas.microsoft.com/office/drawing/2014/main" val="3479445715"/>
+                  </a:ext>
+                </a:extLst>
+              </a:tr>
+              <a:tr h="370840">
+                <a:tc>
+                  <a:txBody>
+                    <a:bodyPr/>
+                    <a:lstStyle/>
+                    <a:p>
+                      <a:r>
+                        <a:rPr lang="en-GB" dirty="0">
+                          <a:latin typeface="+mj-lt"/>
+                        </a:rPr>
+                        <a:t>Delft</a:t>
+                      </a:r>
+                    </a:p>
+                  </a:txBody>
+                  <a:tcPr/>
+                </a:tc>
+                <a:tc>
+                  <a:txBody>
+                    <a:bodyPr/>
+                    <a:lstStyle/>
+                    <a:p>
+                      <a:r>
+                        <a:rPr lang="en-GB" dirty="0">
+                          <a:latin typeface="+mj-lt"/>
+                        </a:rPr>
+                        <a:t>Has geometry</a:t>
+                      </a:r>
+                    </a:p>
+                  </a:txBody>
+                  <a:tcPr/>
+                </a:tc>
+                <a:tc>
+                  <a:txBody>
+                    <a:bodyPr/>
+                    <a:lstStyle/>
+                    <a:p>
+                      <a:r>
+                        <a:rPr lang="en-GB" dirty="0">
+                          <a:latin typeface="+mj-lt"/>
+                        </a:rPr>
+                        <a:t>POLYGON((X</a:t>
+                      </a:r>
+                      <a:r>
+                        <a:rPr lang="en-GB" baseline="-25000" dirty="0">
+                          <a:latin typeface="+mj-lt"/>
+                        </a:rPr>
+                        <a:t>1</a:t>
+                      </a:r>
+                      <a:r>
+                        <a:rPr lang="en-GB" baseline="0" dirty="0">
+                          <a:latin typeface="+mj-lt"/>
+                        </a:rPr>
+                        <a:t> Y</a:t>
+                      </a:r>
+                      <a:r>
+                        <a:rPr lang="en-GB" baseline="-25000" dirty="0">
+                          <a:latin typeface="+mj-lt"/>
+                        </a:rPr>
+                        <a:t>1</a:t>
+                      </a:r>
+                      <a:r>
+                        <a:rPr lang="en-GB" baseline="0" dirty="0">
+                          <a:latin typeface="+mj-lt"/>
+                        </a:rPr>
+                        <a:t>, </a:t>
+                      </a:r>
+                      <a:r>
+                        <a:rPr lang="en-GB" dirty="0">
+                          <a:latin typeface="+mj-lt"/>
+                        </a:rPr>
+                        <a:t>X</a:t>
+                      </a:r>
+                      <a:r>
+                        <a:rPr lang="en-GB" baseline="-25000" dirty="0">
+                          <a:latin typeface="+mj-lt"/>
+                        </a:rPr>
+                        <a:t>2</a:t>
+                      </a:r>
+                      <a:r>
+                        <a:rPr lang="en-GB" baseline="0" dirty="0">
+                          <a:latin typeface="+mj-lt"/>
+                        </a:rPr>
+                        <a:t> Y</a:t>
+                      </a:r>
+                      <a:r>
+                        <a:rPr lang="en-GB" baseline="-25000" dirty="0">
+                          <a:latin typeface="+mj-lt"/>
+                        </a:rPr>
+                        <a:t>2</a:t>
+                      </a:r>
+                      <a:r>
+                        <a:rPr lang="en-GB" baseline="0" dirty="0">
+                          <a:latin typeface="+mj-lt"/>
+                        </a:rPr>
+                        <a:t>, … </a:t>
+                      </a:r>
+                      <a:r>
+                        <a:rPr lang="en-GB" dirty="0" err="1">
+                          <a:latin typeface="+mj-lt"/>
+                        </a:rPr>
+                        <a:t>X</a:t>
+                      </a:r>
+                      <a:r>
+                        <a:rPr lang="en-GB" baseline="-25000" dirty="0" err="1">
+                          <a:latin typeface="+mj-lt"/>
+                        </a:rPr>
+                        <a:t>n</a:t>
+                      </a:r>
+                      <a:r>
+                        <a:rPr lang="en-GB" baseline="0" dirty="0">
+                          <a:latin typeface="+mj-lt"/>
+                        </a:rPr>
+                        <a:t> </a:t>
+                      </a:r>
+                      <a:r>
+                        <a:rPr lang="en-GB" baseline="0" dirty="0" err="1">
+                          <a:latin typeface="+mj-lt"/>
+                        </a:rPr>
+                        <a:t>Y</a:t>
+                      </a:r>
+                      <a:r>
+                        <a:rPr lang="en-GB" baseline="-25000" dirty="0" err="1">
+                          <a:latin typeface="+mj-lt"/>
+                        </a:rPr>
+                        <a:t>n</a:t>
+                      </a:r>
+                      <a:r>
+                        <a:rPr lang="en-GB" baseline="0" dirty="0">
+                          <a:latin typeface="+mj-lt"/>
+                        </a:rPr>
+                        <a:t>, </a:t>
+                      </a:r>
+                      <a:r>
+                        <a:rPr lang="en-GB" dirty="0">
+                          <a:latin typeface="+mj-lt"/>
+                        </a:rPr>
+                        <a:t>X</a:t>
+                      </a:r>
+                      <a:r>
+                        <a:rPr lang="en-GB" baseline="-25000" dirty="0">
+                          <a:latin typeface="+mj-lt"/>
+                        </a:rPr>
+                        <a:t>1</a:t>
+                      </a:r>
+                      <a:r>
+                        <a:rPr lang="en-GB" baseline="0" dirty="0">
+                          <a:latin typeface="+mj-lt"/>
+                        </a:rPr>
+                        <a:t> Y</a:t>
+                      </a:r>
+                      <a:r>
+                        <a:rPr lang="en-GB" baseline="-25000" dirty="0">
+                          <a:latin typeface="+mj-lt"/>
+                        </a:rPr>
+                        <a:t>1</a:t>
+                      </a:r>
+                      <a:r>
+                        <a:rPr lang="en-GB" dirty="0">
+                          <a:latin typeface="+mj-lt"/>
+                        </a:rPr>
+                        <a:t>))</a:t>
+                      </a:r>
+                    </a:p>
+                  </a:txBody>
+                  <a:tcPr/>
+                </a:tc>
+                <a:extLst>
+                  <a:ext uri="{0D108BD9-81ED-4DB2-BD59-A6C34878D82A}">
+                    <a16:rowId xmlns:a16="http://schemas.microsoft.com/office/drawing/2014/main" val="2108593395"/>
+                  </a:ext>
+                </a:extLst>
+              </a:tr>
+            </a:tbl>
+          </a:graphicData>
+        </a:graphic>
+      </p:graphicFrame>
+    </p:spTree>
+    <p:extLst>
+      <p:ext uri="{BB962C8B-B14F-4D97-AF65-F5344CB8AC3E}">
+        <p14:creationId xmlns:p14="http://schemas.microsoft.com/office/powerpoint/2010/main" val="1792160687"/>
       </p:ext>
     </p:extLst>
   </p:cSld>

</xml_diff>

<commit_message>
updated based on P4 feedback
</commit_message>
<xml_diff>
--- a/Reports/UML/diagram.pptx
+++ b/Reports/UML/diagram.pptx
@@ -261,7 +261,7 @@
           <a:p>
             <a:fld id="{37D254DE-7F3D-4BFF-BC2F-8BA99F5ABEC1}" type="datetimeFigureOut">
               <a:rPr lang="en-GB" smtClean="0"/>
-              <a:t>12/05/2016</a:t>
+              <a:t>17/05/2016</a:t>
             </a:fld>
             <a:endParaRPr lang="en-GB"/>
           </a:p>
@@ -431,7 +431,7 @@
           <a:p>
             <a:fld id="{37D254DE-7F3D-4BFF-BC2F-8BA99F5ABEC1}" type="datetimeFigureOut">
               <a:rPr lang="en-GB" smtClean="0"/>
-              <a:t>12/05/2016</a:t>
+              <a:t>17/05/2016</a:t>
             </a:fld>
             <a:endParaRPr lang="en-GB"/>
           </a:p>
@@ -611,7 +611,7 @@
           <a:p>
             <a:fld id="{37D254DE-7F3D-4BFF-BC2F-8BA99F5ABEC1}" type="datetimeFigureOut">
               <a:rPr lang="en-GB" smtClean="0"/>
-              <a:t>12/05/2016</a:t>
+              <a:t>17/05/2016</a:t>
             </a:fld>
             <a:endParaRPr lang="en-GB"/>
           </a:p>
@@ -781,7 +781,7 @@
           <a:p>
             <a:fld id="{37D254DE-7F3D-4BFF-BC2F-8BA99F5ABEC1}" type="datetimeFigureOut">
               <a:rPr lang="en-GB" smtClean="0"/>
-              <a:t>12/05/2016</a:t>
+              <a:t>17/05/2016</a:t>
             </a:fld>
             <a:endParaRPr lang="en-GB"/>
           </a:p>
@@ -1027,7 +1027,7 @@
           <a:p>
             <a:fld id="{37D254DE-7F3D-4BFF-BC2F-8BA99F5ABEC1}" type="datetimeFigureOut">
               <a:rPr lang="en-GB" smtClean="0"/>
-              <a:t>12/05/2016</a:t>
+              <a:t>17/05/2016</a:t>
             </a:fld>
             <a:endParaRPr lang="en-GB"/>
           </a:p>
@@ -1259,7 +1259,7 @@
           <a:p>
             <a:fld id="{37D254DE-7F3D-4BFF-BC2F-8BA99F5ABEC1}" type="datetimeFigureOut">
               <a:rPr lang="en-GB" smtClean="0"/>
-              <a:t>12/05/2016</a:t>
+              <a:t>17/05/2016</a:t>
             </a:fld>
             <a:endParaRPr lang="en-GB"/>
           </a:p>
@@ -1626,7 +1626,7 @@
           <a:p>
             <a:fld id="{37D254DE-7F3D-4BFF-BC2F-8BA99F5ABEC1}" type="datetimeFigureOut">
               <a:rPr lang="en-GB" smtClean="0"/>
-              <a:t>12/05/2016</a:t>
+              <a:t>17/05/2016</a:t>
             </a:fld>
             <a:endParaRPr lang="en-GB"/>
           </a:p>
@@ -1744,7 +1744,7 @@
           <a:p>
             <a:fld id="{37D254DE-7F3D-4BFF-BC2F-8BA99F5ABEC1}" type="datetimeFigureOut">
               <a:rPr lang="en-GB" smtClean="0"/>
-              <a:t>12/05/2016</a:t>
+              <a:t>17/05/2016</a:t>
             </a:fld>
             <a:endParaRPr lang="en-GB"/>
           </a:p>
@@ -1839,7 +1839,7 @@
           <a:p>
             <a:fld id="{37D254DE-7F3D-4BFF-BC2F-8BA99F5ABEC1}" type="datetimeFigureOut">
               <a:rPr lang="en-GB" smtClean="0"/>
-              <a:t>12/05/2016</a:t>
+              <a:t>17/05/2016</a:t>
             </a:fld>
             <a:endParaRPr lang="en-GB"/>
           </a:p>
@@ -2116,7 +2116,7 @@
           <a:p>
             <a:fld id="{37D254DE-7F3D-4BFF-BC2F-8BA99F5ABEC1}" type="datetimeFigureOut">
               <a:rPr lang="en-GB" smtClean="0"/>
-              <a:t>12/05/2016</a:t>
+              <a:t>17/05/2016</a:t>
             </a:fld>
             <a:endParaRPr lang="en-GB"/>
           </a:p>
@@ -2369,7 +2369,7 @@
           <a:p>
             <a:fld id="{37D254DE-7F3D-4BFF-BC2F-8BA99F5ABEC1}" type="datetimeFigureOut">
               <a:rPr lang="en-GB" smtClean="0"/>
-              <a:t>12/05/2016</a:t>
+              <a:t>17/05/2016</a:t>
             </a:fld>
             <a:endParaRPr lang="en-GB"/>
           </a:p>
@@ -2582,7 +2582,7 @@
           <a:p>
             <a:fld id="{37D254DE-7F3D-4BFF-BC2F-8BA99F5ABEC1}" type="datetimeFigureOut">
               <a:rPr lang="en-GB" smtClean="0"/>
-              <a:t>12/05/2016</a:t>
+              <a:t>17/05/2016</a:t>
             </a:fld>
             <a:endParaRPr lang="en-GB"/>
           </a:p>
@@ -3844,10 +3844,9 @@
           <a:p>
             <a:pPr algn="ctr"/>
             <a:r>
-              <a:rPr lang="en-GB" dirty="0" err="1"/>
+              <a:rPr lang="en-GB" dirty="0"/>
               <a:t>DBPedia</a:t>
             </a:r>
-            <a:endParaRPr lang="en-GB" dirty="0"/>
           </a:p>
         </p:txBody>
       </p:sp>

</xml_diff>